<commit_message>
corrigindo informações e adicionando o projeto 2
</commit_message>
<xml_diff>
--- a/criando-ebook/output/template.pptx
+++ b/criando-ebook/output/template.pptx
@@ -4782,6 +4782,72 @@
           </a:p>
         </p:txBody>
       </p:sp>
+      <p:sp>
+        <p:nvSpPr>
+          <p:cNvPr id="2" name="CaixaDeTexto 1">
+            <a:extLst>
+              <a:ext uri="{FF2B5EF4-FFF2-40B4-BE49-F238E27FC236}">
+                <a16:creationId xmlns:a16="http://schemas.microsoft.com/office/drawing/2014/main" id="{6F6567B1-D672-9F1D-FEA0-948298327464}"/>
+              </a:ext>
+            </a:extLst>
+          </p:cNvPr>
+          <p:cNvSpPr txBox="1"/>
+          <p:nvPr/>
+        </p:nvSpPr>
+        <p:spPr>
+          <a:xfrm>
+            <a:off x="1242646" y="10201835"/>
+            <a:ext cx="7449941" cy="830997"/>
+          </a:xfrm>
+          <a:prstGeom prst="rect">
+            <a:avLst/>
+          </a:prstGeom>
+          <a:noFill/>
+        </p:spPr>
+        <p:txBody>
+          <a:bodyPr wrap="square" rtlCol="0">
+            <a:spAutoFit/>
+          </a:bodyPr>
+          <a:lstStyle/>
+          <a:p>
+            <a:pPr algn="just"/>
+            <a:r>
+              <a:rPr lang="pt-BR" sz="2400" dirty="0">
+                <a:solidFill>
+                  <a:schemeClr val="bg1"/>
+                </a:solidFill>
+                <a:latin typeface="Georgia" panose="02040502050405020303" pitchFamily="18" charset="0"/>
+              </a:rPr>
+              <a:t>https://github.com/nicolyjjang/</a:t>
+            </a:r>
+            <a:r>
+              <a:rPr lang="pt-BR" sz="2400" dirty="0">
+                <a:solidFill>
+                  <a:schemeClr val="bg1"/>
+                </a:solidFill>
+                <a:latin typeface="Georgia" panose="02040502050405020303" pitchFamily="18" charset="0"/>
+                <a:hlinkClick r:id="rId3">
+                  <a:extLst>
+                    <a:ext uri="{A12FA001-AC4F-418D-AE19-62706E023703}">
+                      <ahyp:hlinkClr xmlns:ahyp="http://schemas.microsoft.com/office/drawing/2018/hyperlinkcolor" val="tx"/>
+                    </a:ext>
+                  </a:extLst>
+                </a:hlinkClick>
+              </a:rPr>
+              <a:t>bootcamp-genai-caixa</a:t>
+            </a:r>
+            <a:r>
+              <a:rPr lang="pt-BR" sz="2400" dirty="0">
+                <a:solidFill>
+                  <a:schemeClr val="bg1"/>
+                </a:solidFill>
+                <a:latin typeface="Georgia" panose="02040502050405020303" pitchFamily="18" charset="0"/>
+              </a:rPr>
+              <a:t>/blob/main/criando-ebook/README.md</a:t>
+            </a:r>
+          </a:p>
+        </p:txBody>
+      </p:sp>
     </p:spTree>
     <p:extLst>
       <p:ext uri="{BB962C8B-B14F-4D97-AF65-F5344CB8AC3E}">

</xml_diff>